<commit_message>
Added dedicated gas reference shift calculation to report
</commit_message>
<xml_diff>
--- a/spectroscopy_process_functions/spectSummary.pptx
+++ b/spectroscopy_process_functions/spectSummary.pptx
@@ -1225,7 +1225,7 @@
           <a:p>
             <a:fld id="{4104931B-FA04-4F9D-8677-E91658DBD28D}" type="datetimeFigureOut">
               <a:rPr lang="en-US" smtClean="0"/>
-              <a:t>10/16/22</a:t>
+              <a:t>7/21/25</a:t>
             </a:fld>
             <a:endParaRPr lang="en-US"/>
           </a:p>
@@ -1402,7 +1402,7 @@
           <a:p>
             <a:fld id="{14C6C082-737C-43E5-99DE-DC885CF455F1}" type="datetimeFigureOut">
               <a:rPr lang="en-US" smtClean="0"/>
-              <a:t>10/16/22</a:t>
+              <a:t>7/21/25</a:t>
             </a:fld>
             <a:endParaRPr lang="en-US"/>
           </a:p>
@@ -1816,7 +1816,7 @@
           <a:p>
             <a:fld id="{6A89DDFB-EE36-402F-9051-7491A3255DAB}" type="datetimeFigureOut">
               <a:rPr lang="en-US" smtClean="0"/>
-              <a:t>10/16/22</a:t>
+              <a:t>7/21/25</a:t>
             </a:fld>
             <a:endParaRPr lang="en-US"/>
           </a:p>
@@ -2014,7 +2014,7 @@
           <a:p>
             <a:fld id="{6A89DDFB-EE36-402F-9051-7491A3255DAB}" type="datetimeFigureOut">
               <a:rPr lang="en-US" smtClean="0"/>
-              <a:t>10/16/22</a:t>
+              <a:t>7/21/25</a:t>
             </a:fld>
             <a:endParaRPr lang="en-US"/>
           </a:p>
@@ -2222,7 +2222,7 @@
           <a:p>
             <a:fld id="{6A89DDFB-EE36-402F-9051-7491A3255DAB}" type="datetimeFigureOut">
               <a:rPr lang="en-US" smtClean="0"/>
-              <a:t>10/16/22</a:t>
+              <a:t>7/21/25</a:t>
             </a:fld>
             <a:endParaRPr lang="en-US"/>
           </a:p>
@@ -2331,7 +2331,7 @@
         <p:spPr>
           <a:xfrm>
             <a:off x="161016" y="1390289"/>
-            <a:ext cx="4005072" cy="2130552"/>
+            <a:ext cx="4005072" cy="2578608"/>
           </a:xfrm>
           <a:noFill/>
           <a:ln w="19050">
@@ -2429,8 +2429,8 @@
         </p:nvSpPr>
         <p:spPr>
           <a:xfrm>
-            <a:off x="737656" y="4105728"/>
-            <a:ext cx="2743200" cy="2743200"/>
+            <a:off x="737656" y="4693110"/>
+            <a:ext cx="2743200" cy="2155818"/>
           </a:xfrm>
         </p:spPr>
         <p:txBody>
@@ -2489,7 +2489,7 @@
         </p:nvSpPr>
         <p:spPr>
           <a:xfrm>
-            <a:off x="1406171" y="3742161"/>
+            <a:off x="1402143" y="4197342"/>
             <a:ext cx="2761488" cy="173736"/>
           </a:xfrm>
         </p:spPr>
@@ -2654,8 +2654,118 @@
         </p:nvSpPr>
         <p:spPr>
           <a:xfrm>
-            <a:off x="998766" y="3933939"/>
-            <a:ext cx="2350008" cy="448056"/>
+            <a:off x="988547" y="4371078"/>
+            <a:ext cx="2350008" cy="313932"/>
+          </a:xfrm>
+        </p:spPr>
+        <p:txBody>
+          <a:bodyPr>
+            <a:spAutoFit/>
+          </a:bodyPr>
+          <a:lstStyle>
+            <a:lvl1pPr marL="0" indent="0" algn="ctr">
+              <a:buNone/>
+              <a:defRPr sz="1600" b="1" u="sng">
+                <a:latin typeface="+mn-lt"/>
+              </a:defRPr>
+            </a:lvl1pPr>
+            <a:lvl2pPr>
+              <a:defRPr sz="1600" b="1" u="sng"/>
+            </a:lvl2pPr>
+            <a:lvl3pPr>
+              <a:defRPr sz="1600" b="1" u="sng"/>
+            </a:lvl3pPr>
+            <a:lvl4pPr>
+              <a:defRPr sz="1600" b="1" u="sng"/>
+            </a:lvl4pPr>
+            <a:lvl5pPr>
+              <a:defRPr sz="1600" b="1" u="sng"/>
+            </a:lvl5pPr>
+          </a:lstStyle>
+          <a:p>
+            <a:pPr lvl="0"/>
+            <a:r>
+              <a:rPr lang="en-US" dirty="0"/>
+              <a:t>Click to edit</a:t>
+            </a:r>
+          </a:p>
+        </p:txBody>
+      </p:sp>
+      <p:sp>
+        <p:nvSpPr>
+          <p:cNvPr id="23" name="Pkpk Text">
+            <a:extLst>
+              <a:ext uri="{FF2B5EF4-FFF2-40B4-BE49-F238E27FC236}">
+                <a16:creationId xmlns:a16="http://schemas.microsoft.com/office/drawing/2014/main" id="{A1E3B4F5-11EE-470B-91B0-C9438F441BAA}"/>
+              </a:ext>
+            </a:extLst>
+          </p:cNvPr>
+          <p:cNvSpPr>
+            <a:spLocks noGrp="1"/>
+          </p:cNvSpPr>
+          <p:nvPr>
+            <p:ph type="body" sz="quarter" idx="31"/>
+          </p:nvPr>
+        </p:nvSpPr>
+        <p:spPr>
+          <a:xfrm>
+            <a:off x="8660932" y="1024461"/>
+            <a:ext cx="2862072" cy="244682"/>
+          </a:xfrm>
+        </p:spPr>
+        <p:txBody>
+          <a:bodyPr>
+            <a:spAutoFit/>
+          </a:bodyPr>
+          <a:lstStyle>
+            <a:lvl1pPr marL="0" indent="0" algn="ctr">
+              <a:buNone/>
+              <a:defRPr sz="1100" b="1" u="none">
+                <a:latin typeface="+mn-lt"/>
+              </a:defRPr>
+            </a:lvl1pPr>
+            <a:lvl2pPr>
+              <a:defRPr sz="1600" b="1" u="sng"/>
+            </a:lvl2pPr>
+            <a:lvl3pPr>
+              <a:defRPr sz="1600" b="1" u="sng"/>
+            </a:lvl3pPr>
+            <a:lvl4pPr>
+              <a:defRPr sz="1600" b="1" u="sng"/>
+            </a:lvl4pPr>
+            <a:lvl5pPr>
+              <a:defRPr sz="1600" b="1" u="sng"/>
+            </a:lvl5pPr>
+          </a:lstStyle>
+          <a:p>
+            <a:pPr lvl="0"/>
+            <a:r>
+              <a:rPr lang="en-US" dirty="0"/>
+              <a:t>Click to edit</a:t>
+            </a:r>
+          </a:p>
+        </p:txBody>
+      </p:sp>
+      <p:sp>
+        <p:nvSpPr>
+          <p:cNvPr id="20" name="Amp Text">
+            <a:extLst>
+              <a:ext uri="{FF2B5EF4-FFF2-40B4-BE49-F238E27FC236}">
+                <a16:creationId xmlns:a16="http://schemas.microsoft.com/office/drawing/2014/main" id="{534D7EDC-4147-4BE1-ADC4-361350413F5A}"/>
+              </a:ext>
+            </a:extLst>
+          </p:cNvPr>
+          <p:cNvSpPr>
+            <a:spLocks noGrp="1"/>
+          </p:cNvSpPr>
+          <p:nvPr>
+            <p:ph type="body" sz="quarter" idx="29"/>
+          </p:nvPr>
+        </p:nvSpPr>
+        <p:spPr>
+          <a:xfrm>
+            <a:off x="8144296" y="746221"/>
+            <a:ext cx="3895344" cy="402336"/>
           </a:xfrm>
         </p:spPr>
         <p:txBody>
@@ -2693,79 +2803,24 @@
       </p:sp>
       <p:sp>
         <p:nvSpPr>
-          <p:cNvPr id="23" name="Pkpk Text">
-            <a:extLst>
-              <a:ext uri="{FF2B5EF4-FFF2-40B4-BE49-F238E27FC236}">
-                <a16:creationId xmlns:a16="http://schemas.microsoft.com/office/drawing/2014/main" id="{A1E3B4F5-11EE-470B-91B0-C9438F441BAA}"/>
-              </a:ext>
-            </a:extLst>
-          </p:cNvPr>
-          <p:cNvSpPr>
-            <a:spLocks noGrp="1"/>
-          </p:cNvSpPr>
-          <p:nvPr>
-            <p:ph type="body" sz="quarter" idx="31"/>
+          <p:cNvPr id="19" name="Osc Text">
+            <a:extLst>
+              <a:ext uri="{FF2B5EF4-FFF2-40B4-BE49-F238E27FC236}">
+                <a16:creationId xmlns:a16="http://schemas.microsoft.com/office/drawing/2014/main" id="{CD5434F5-D50C-4D0A-99B5-463AE2B5B455}"/>
+              </a:ext>
+            </a:extLst>
+          </p:cNvPr>
+          <p:cNvSpPr>
+            <a:spLocks noGrp="1"/>
+          </p:cNvSpPr>
+          <p:nvPr>
+            <p:ph type="body" sz="quarter" idx="28"/>
           </p:nvPr>
         </p:nvSpPr>
         <p:spPr>
           <a:xfrm>
-            <a:off x="8660932" y="1024461"/>
-            <a:ext cx="2862072" cy="244682"/>
-          </a:xfrm>
-        </p:spPr>
-        <p:txBody>
-          <a:bodyPr>
-            <a:spAutoFit/>
-          </a:bodyPr>
-          <a:lstStyle>
-            <a:lvl1pPr marL="0" indent="0" algn="ctr">
-              <a:buNone/>
-              <a:defRPr sz="1100" b="1" u="none">
-                <a:latin typeface="+mn-lt"/>
-              </a:defRPr>
-            </a:lvl1pPr>
-            <a:lvl2pPr>
-              <a:defRPr sz="1600" b="1" u="sng"/>
-            </a:lvl2pPr>
-            <a:lvl3pPr>
-              <a:defRPr sz="1600" b="1" u="sng"/>
-            </a:lvl3pPr>
-            <a:lvl4pPr>
-              <a:defRPr sz="1600" b="1" u="sng"/>
-            </a:lvl4pPr>
-            <a:lvl5pPr>
-              <a:defRPr sz="1600" b="1" u="sng"/>
-            </a:lvl5pPr>
-          </a:lstStyle>
-          <a:p>
-            <a:pPr lvl="0"/>
-            <a:r>
-              <a:rPr lang="en-US" dirty="0"/>
-              <a:t>Click to edit</a:t>
-            </a:r>
-          </a:p>
-        </p:txBody>
-      </p:sp>
-      <p:sp>
-        <p:nvSpPr>
-          <p:cNvPr id="20" name="Amp Text">
-            <a:extLst>
-              <a:ext uri="{FF2B5EF4-FFF2-40B4-BE49-F238E27FC236}">
-                <a16:creationId xmlns:a16="http://schemas.microsoft.com/office/drawing/2014/main" id="{534D7EDC-4147-4BE1-ADC4-361350413F5A}"/>
-              </a:ext>
-            </a:extLst>
-          </p:cNvPr>
-          <p:cNvSpPr>
-            <a:spLocks noGrp="1"/>
-          </p:cNvSpPr>
-          <p:nvPr>
-            <p:ph type="body" sz="quarter" idx="29"/>
-          </p:nvPr>
-        </p:nvSpPr>
-        <p:spPr>
-          <a:xfrm>
-            <a:off x="8144296" y="746221"/>
-            <a:ext cx="3895344" cy="402336"/>
+            <a:off x="4523906" y="746221"/>
+            <a:ext cx="3300984" cy="402336"/>
           </a:xfrm>
         </p:spPr>
         <p:txBody>
@@ -2803,24 +2858,24 @@
       </p:sp>
       <p:sp>
         <p:nvSpPr>
-          <p:cNvPr id="19" name="Osc Text">
-            <a:extLst>
-              <a:ext uri="{FF2B5EF4-FFF2-40B4-BE49-F238E27FC236}">
-                <a16:creationId xmlns:a16="http://schemas.microsoft.com/office/drawing/2014/main" id="{CD5434F5-D50C-4D0A-99B5-463AE2B5B455}"/>
-              </a:ext>
-            </a:extLst>
-          </p:cNvPr>
-          <p:cNvSpPr>
-            <a:spLocks noGrp="1"/>
-          </p:cNvSpPr>
-          <p:nvPr>
-            <p:ph type="body" sz="quarter" idx="28"/>
+          <p:cNvPr id="9" name="Dyn Text">
+            <a:extLst>
+              <a:ext uri="{FF2B5EF4-FFF2-40B4-BE49-F238E27FC236}">
+                <a16:creationId xmlns:a16="http://schemas.microsoft.com/office/drawing/2014/main" id="{F46B1B45-F1D4-42CF-A486-DF194CD94683}"/>
+              </a:ext>
+            </a:extLst>
+          </p:cNvPr>
+          <p:cNvSpPr>
+            <a:spLocks noGrp="1"/>
+          </p:cNvSpPr>
+          <p:nvPr>
+            <p:ph type="body" sz="quarter" idx="27"/>
           </p:nvPr>
         </p:nvSpPr>
         <p:spPr>
           <a:xfrm>
-            <a:off x="4523906" y="746221"/>
-            <a:ext cx="3300984" cy="402336"/>
+            <a:off x="8220851" y="3601640"/>
+            <a:ext cx="3895344" cy="402336"/>
           </a:xfrm>
         </p:spPr>
         <p:txBody>
@@ -2858,61 +2913,6 @@
       </p:sp>
       <p:sp>
         <p:nvSpPr>
-          <p:cNvPr id="9" name="Dyn Text">
-            <a:extLst>
-              <a:ext uri="{FF2B5EF4-FFF2-40B4-BE49-F238E27FC236}">
-                <a16:creationId xmlns:a16="http://schemas.microsoft.com/office/drawing/2014/main" id="{F46B1B45-F1D4-42CF-A486-DF194CD94683}"/>
-              </a:ext>
-            </a:extLst>
-          </p:cNvPr>
-          <p:cNvSpPr>
-            <a:spLocks noGrp="1"/>
-          </p:cNvSpPr>
-          <p:nvPr>
-            <p:ph type="body" sz="quarter" idx="27"/>
-          </p:nvPr>
-        </p:nvSpPr>
-        <p:spPr>
-          <a:xfrm>
-            <a:off x="8220851" y="3601640"/>
-            <a:ext cx="3895344" cy="402336"/>
-          </a:xfrm>
-        </p:spPr>
-        <p:txBody>
-          <a:bodyPr>
-            <a:spAutoFit/>
-          </a:bodyPr>
-          <a:lstStyle>
-            <a:lvl1pPr marL="0" indent="0" algn="ctr">
-              <a:buNone/>
-              <a:defRPr sz="2000" b="1" u="sng">
-                <a:latin typeface="+mn-lt"/>
-              </a:defRPr>
-            </a:lvl1pPr>
-            <a:lvl2pPr>
-              <a:defRPr sz="1600" b="1" u="sng"/>
-            </a:lvl2pPr>
-            <a:lvl3pPr>
-              <a:defRPr sz="1600" b="1" u="sng"/>
-            </a:lvl3pPr>
-            <a:lvl4pPr>
-              <a:defRPr sz="1600" b="1" u="sng"/>
-            </a:lvl4pPr>
-            <a:lvl5pPr>
-              <a:defRPr sz="1600" b="1" u="sng"/>
-            </a:lvl5pPr>
-          </a:lstStyle>
-          <a:p>
-            <a:pPr lvl="0"/>
-            <a:r>
-              <a:rPr lang="en-US" dirty="0"/>
-              <a:t>Click to edit</a:t>
-            </a:r>
-          </a:p>
-        </p:txBody>
-      </p:sp>
-      <p:sp>
-        <p:nvSpPr>
           <p:cNvPr id="2" name="Title 1"/>
           <p:cNvSpPr>
             <a:spLocks noGrp="1"/>
@@ -3135,8 +3135,8 @@
         </p:nvSpPr>
         <p:spPr>
           <a:xfrm>
-            <a:off x="1020552" y="1390289"/>
-            <a:ext cx="3145536" cy="2130552"/>
+            <a:off x="1020552" y="1390288"/>
+            <a:ext cx="3145536" cy="2578607"/>
           </a:xfrm>
           <a:noFill/>
           <a:ln w="19050">
@@ -3601,8 +3601,8 @@
         </p:nvSpPr>
         <p:spPr>
           <a:xfrm>
-            <a:off x="92095" y="989817"/>
-            <a:ext cx="4069080" cy="2926080"/>
+            <a:off x="92095" y="989816"/>
+            <a:ext cx="4069080" cy="3373163"/>
           </a:xfrm>
         </p:spPr>
         <p:txBody>
@@ -3910,7 +3910,7 @@
           <a:p>
             <a:fld id="{6A89DDFB-EE36-402F-9051-7491A3255DAB}" type="datetimeFigureOut">
               <a:rPr lang="en-US" smtClean="0"/>
-              <a:t>10/16/22</a:t>
+              <a:t>7/21/25</a:t>
             </a:fld>
             <a:endParaRPr lang="en-US"/>
           </a:p>
@@ -4185,7 +4185,7 @@
           <a:p>
             <a:fld id="{6A89DDFB-EE36-402F-9051-7491A3255DAB}" type="datetimeFigureOut">
               <a:rPr lang="en-US" smtClean="0"/>
-              <a:t>10/16/22</a:t>
+              <a:t>7/21/25</a:t>
             </a:fld>
             <a:endParaRPr lang="en-US"/>
           </a:p>
@@ -4450,7 +4450,7 @@
           <a:p>
             <a:fld id="{6A89DDFB-EE36-402F-9051-7491A3255DAB}" type="datetimeFigureOut">
               <a:rPr lang="en-US" smtClean="0"/>
-              <a:t>10/16/22</a:t>
+              <a:t>7/21/25</a:t>
             </a:fld>
             <a:endParaRPr lang="en-US"/>
           </a:p>
@@ -4862,7 +4862,7 @@
           <a:p>
             <a:fld id="{6A89DDFB-EE36-402F-9051-7491A3255DAB}" type="datetimeFigureOut">
               <a:rPr lang="en-US" smtClean="0"/>
-              <a:t>10/16/22</a:t>
+              <a:t>7/21/25</a:t>
             </a:fld>
             <a:endParaRPr lang="en-US"/>
           </a:p>
@@ -5003,7 +5003,7 @@
           <a:p>
             <a:fld id="{6A89DDFB-EE36-402F-9051-7491A3255DAB}" type="datetimeFigureOut">
               <a:rPr lang="en-US" smtClean="0"/>
-              <a:t>10/16/22</a:t>
+              <a:t>7/21/25</a:t>
             </a:fld>
             <a:endParaRPr lang="en-US"/>
           </a:p>
@@ -5116,7 +5116,7 @@
           <a:p>
             <a:fld id="{6A89DDFB-EE36-402F-9051-7491A3255DAB}" type="datetimeFigureOut">
               <a:rPr lang="en-US" smtClean="0"/>
-              <a:t>10/16/22</a:t>
+              <a:t>7/21/25</a:t>
             </a:fld>
             <a:endParaRPr lang="en-US"/>
           </a:p>
@@ -5427,7 +5427,7 @@
           <a:p>
             <a:fld id="{6A89DDFB-EE36-402F-9051-7491A3255DAB}" type="datetimeFigureOut">
               <a:rPr lang="en-US" smtClean="0"/>
-              <a:t>10/16/22</a:t>
+              <a:t>7/21/25</a:t>
             </a:fld>
             <a:endParaRPr lang="en-US"/>
           </a:p>
@@ -5715,7 +5715,7 @@
           <a:p>
             <a:fld id="{6A89DDFB-EE36-402F-9051-7491A3255DAB}" type="datetimeFigureOut">
               <a:rPr lang="en-US" smtClean="0"/>
-              <a:t>10/16/22</a:t>
+              <a:t>7/21/25</a:t>
             </a:fld>
             <a:endParaRPr lang="en-US"/>
           </a:p>
@@ -5956,7 +5956,7 @@
           <a:p>
             <a:fld id="{6A89DDFB-EE36-402F-9051-7491A3255DAB}" type="datetimeFigureOut">
               <a:rPr lang="en-US" smtClean="0"/>
-              <a:t>10/16/22</a:t>
+              <a:t>7/21/25</a:t>
             </a:fld>
             <a:endParaRPr lang="en-US"/>
           </a:p>

</xml_diff>